<commit_message>
3rd jan 4:48 am
Linear regression graphs
</commit_message>
<xml_diff>
--- a/Linear_Regression/Linear_Regression.pptx
+++ b/Linear_Regression/Linear_Regression.pptx
@@ -5,7 +5,7 @@
     <p:sldMasterId id="2147483660" r:id="rId1"/>
   </p:sldMasterIdLst>
   <p:notesMasterIdLst>
-    <p:notesMasterId r:id="rId11"/>
+    <p:notesMasterId r:id="rId13"/>
   </p:notesMasterIdLst>
   <p:sldIdLst>
     <p:sldId id="257" r:id="rId2"/>
@@ -17,6 +17,8 @@
     <p:sldId id="262" r:id="rId8"/>
     <p:sldId id="265" r:id="rId9"/>
     <p:sldId id="264" r:id="rId10"/>
+    <p:sldId id="266" r:id="rId11"/>
+    <p:sldId id="267" r:id="rId12"/>
   </p:sldIdLst>
   <p:sldSz cx="9144000" cy="6858000" type="screen4x3"/>
   <p:notesSz cx="6858000" cy="9144000"/>
@@ -5415,7 +5417,6 @@
               <a:rPr lang="en-US" dirty="0"/>
               <a:t>C</a:t>
             </a:r>
-            <a:endParaRPr lang="en-US" dirty="0"/>
           </a:p>
         </p:txBody>
       </p:sp>
@@ -7397,6 +7398,1021 @@
       <p:bldP spid="19" grpId="0"/>
       <p:bldP spid="23" grpId="0"/>
     </p:bldLst>
+  </p:timing>
+</p:sld>
+</file>
+
+<file path=ppt/slides/slide10.xml><?xml version="1.0" encoding="utf-8"?>
+<p:sld xmlns:a="http://schemas.openxmlformats.org/drawingml/2006/main" xmlns:r="http://schemas.openxmlformats.org/officeDocument/2006/relationships" xmlns:p="http://schemas.openxmlformats.org/presentationml/2006/main">
+  <p:cSld>
+    <p:spTree>
+      <p:nvGrpSpPr>
+        <p:cNvPr id="1" name=""/>
+        <p:cNvGrpSpPr/>
+        <p:nvPr/>
+      </p:nvGrpSpPr>
+      <p:grpSpPr>
+        <a:xfrm>
+          <a:off x="0" y="0"/>
+          <a:ext cx="0" cy="0"/>
+          <a:chOff x="0" y="0"/>
+          <a:chExt cx="0" cy="0"/>
+        </a:xfrm>
+      </p:grpSpPr>
+      <p:sp>
+        <p:nvSpPr>
+          <p:cNvPr id="2" name="Title 1"/>
+          <p:cNvSpPr>
+            <a:spLocks noGrp="1"/>
+          </p:cNvSpPr>
+          <p:nvPr>
+            <p:ph type="title"/>
+          </p:nvPr>
+        </p:nvSpPr>
+        <p:spPr/>
+        <p:txBody>
+          <a:bodyPr/>
+          <a:lstStyle/>
+          <a:p>
+            <a:r>
+              <a:rPr lang="en-US" dirty="0">
+                <a:solidFill>
+                  <a:schemeClr val="accent1">
+                    <a:lumMod val="75000"/>
+                  </a:schemeClr>
+                </a:solidFill>
+              </a:rPr>
+              <a:t>Linear Regression</a:t>
+            </a:r>
+            <a:endParaRPr lang="en-US" dirty="0"/>
+          </a:p>
+        </p:txBody>
+      </p:sp>
+      <p:sp>
+        <p:nvSpPr>
+          <p:cNvPr id="4" name="Date Placeholder 3"/>
+          <p:cNvSpPr>
+            <a:spLocks noGrp="1"/>
+          </p:cNvSpPr>
+          <p:nvPr>
+            <p:ph type="dt" sz="half" idx="10"/>
+          </p:nvPr>
+        </p:nvSpPr>
+        <p:spPr/>
+        <p:txBody>
+          <a:bodyPr/>
+          <a:lstStyle/>
+          <a:p>
+            <a:fld id="{DBB841AE-9C10-4D54-9B76-4773DF3EF110}" type="datetime3">
+              <a:rPr lang="en-US" smtClean="0"/>
+              <a:t>3 January 2019</a:t>
+            </a:fld>
+            <a:endParaRPr lang="en-US"/>
+          </a:p>
+        </p:txBody>
+      </p:sp>
+      <p:sp>
+        <p:nvSpPr>
+          <p:cNvPr id="5" name="Footer Placeholder 4"/>
+          <p:cNvSpPr>
+            <a:spLocks noGrp="1"/>
+          </p:cNvSpPr>
+          <p:nvPr>
+            <p:ph type="ftr" sz="quarter" idx="11"/>
+          </p:nvPr>
+        </p:nvSpPr>
+        <p:spPr/>
+        <p:txBody>
+          <a:bodyPr/>
+          <a:lstStyle/>
+          <a:p>
+            <a:r>
+              <a:rPr lang="en-US" smtClean="0"/>
+              <a:t>sai Prasad Ashila</a:t>
+            </a:r>
+            <a:endParaRPr lang="en-US"/>
+          </a:p>
+        </p:txBody>
+      </p:sp>
+      <p:sp>
+        <p:nvSpPr>
+          <p:cNvPr id="6" name="Slide Number Placeholder 5"/>
+          <p:cNvSpPr>
+            <a:spLocks noGrp="1"/>
+          </p:cNvSpPr>
+          <p:nvPr>
+            <p:ph type="sldNum" sz="quarter" idx="12"/>
+          </p:nvPr>
+        </p:nvSpPr>
+        <p:spPr/>
+        <p:txBody>
+          <a:bodyPr/>
+          <a:lstStyle/>
+          <a:p>
+            <a:fld id="{2EE3F54D-A22C-49A4-910F-D37A9559DC15}" type="slidenum">
+              <a:rPr lang="en-US" smtClean="0"/>
+              <a:t>10</a:t>
+            </a:fld>
+            <a:endParaRPr lang="en-US"/>
+          </a:p>
+        </p:txBody>
+      </p:sp>
+      <p:sp>
+        <p:nvSpPr>
+          <p:cNvPr id="3" name="Rectangle 2"/>
+          <p:cNvSpPr/>
+          <p:nvPr/>
+        </p:nvSpPr>
+        <p:spPr>
+          <a:xfrm>
+            <a:off x="152400" y="1066800"/>
+            <a:ext cx="4572000" cy="2308324"/>
+          </a:xfrm>
+          <a:prstGeom prst="rect">
+            <a:avLst/>
+          </a:prstGeom>
+        </p:spPr>
+        <p:txBody>
+          <a:bodyPr>
+            <a:spAutoFit/>
+          </a:bodyPr>
+          <a:lstStyle/>
+          <a:p>
+            <a:r>
+              <a:rPr lang="en-US" dirty="0" smtClean="0">
+                <a:solidFill>
+                  <a:srgbClr val="008000"/>
+                </a:solidFill>
+                <a:highlight>
+                  <a:srgbClr val="FFFFFF"/>
+                </a:highlight>
+              </a:rPr>
+              <a:t>#</a:t>
+            </a:r>
+            <a:r>
+              <a:rPr lang="en-US" dirty="0" err="1">
+                <a:solidFill>
+                  <a:srgbClr val="008000"/>
+                </a:solidFill>
+                <a:highlight>
+                  <a:srgbClr val="FFFFFF"/>
+                </a:highlight>
+              </a:rPr>
+              <a:t>visualising</a:t>
+            </a:r>
+            <a:r>
+              <a:rPr lang="en-US" dirty="0">
+                <a:solidFill>
+                  <a:srgbClr val="008000"/>
+                </a:solidFill>
+                <a:highlight>
+                  <a:srgbClr val="FFFFFF"/>
+                </a:highlight>
+              </a:rPr>
+              <a:t> the Test set results</a:t>
+            </a:r>
+            <a:endParaRPr lang="en-US" dirty="0">
+              <a:solidFill>
+                <a:srgbClr val="000000"/>
+              </a:solidFill>
+              <a:highlight>
+                <a:srgbClr val="FFFFFF"/>
+              </a:highlight>
+            </a:endParaRPr>
+          </a:p>
+          <a:p>
+            <a:r>
+              <a:rPr lang="en-US" dirty="0" err="1">
+                <a:solidFill>
+                  <a:srgbClr val="000000"/>
+                </a:solidFill>
+                <a:highlight>
+                  <a:srgbClr val="FFFFFF"/>
+                </a:highlight>
+              </a:rPr>
+              <a:t>plt</a:t>
+            </a:r>
+            <a:r>
+              <a:rPr lang="en-US" b="1" dirty="0" err="1">
+                <a:solidFill>
+                  <a:srgbClr val="000080"/>
+                </a:solidFill>
+                <a:highlight>
+                  <a:srgbClr val="FFFFFF"/>
+                </a:highlight>
+              </a:rPr>
+              <a:t>.</a:t>
+            </a:r>
+            <a:r>
+              <a:rPr lang="en-US" dirty="0" err="1">
+                <a:solidFill>
+                  <a:srgbClr val="000000"/>
+                </a:solidFill>
+                <a:highlight>
+                  <a:srgbClr val="FFFFFF"/>
+                </a:highlight>
+              </a:rPr>
+              <a:t>scatter</a:t>
+            </a:r>
+            <a:r>
+              <a:rPr lang="en-US" b="1" dirty="0">
+                <a:solidFill>
+                  <a:srgbClr val="000080"/>
+                </a:solidFill>
+                <a:highlight>
+                  <a:srgbClr val="FFFFFF"/>
+                </a:highlight>
+              </a:rPr>
+              <a:t>(</a:t>
+            </a:r>
+            <a:r>
+              <a:rPr lang="en-US" dirty="0" err="1">
+                <a:solidFill>
+                  <a:srgbClr val="000000"/>
+                </a:solidFill>
+                <a:highlight>
+                  <a:srgbClr val="FFFFFF"/>
+                </a:highlight>
+              </a:rPr>
+              <a:t>X_test</a:t>
+            </a:r>
+            <a:r>
+              <a:rPr lang="en-US" b="1" dirty="0">
+                <a:solidFill>
+                  <a:srgbClr val="000080"/>
+                </a:solidFill>
+                <a:highlight>
+                  <a:srgbClr val="FFFFFF"/>
+                </a:highlight>
+              </a:rPr>
+              <a:t>,</a:t>
+            </a:r>
+            <a:r>
+              <a:rPr lang="en-US" dirty="0">
+                <a:solidFill>
+                  <a:srgbClr val="000000"/>
+                </a:solidFill>
+                <a:highlight>
+                  <a:srgbClr val="FFFFFF"/>
+                </a:highlight>
+              </a:rPr>
+              <a:t> </a:t>
+            </a:r>
+            <a:r>
+              <a:rPr lang="en-US" dirty="0" err="1">
+                <a:solidFill>
+                  <a:srgbClr val="000000"/>
+                </a:solidFill>
+                <a:highlight>
+                  <a:srgbClr val="FFFFFF"/>
+                </a:highlight>
+              </a:rPr>
+              <a:t>Y_test</a:t>
+            </a:r>
+            <a:r>
+              <a:rPr lang="en-US" b="1" dirty="0">
+                <a:solidFill>
+                  <a:srgbClr val="000080"/>
+                </a:solidFill>
+                <a:highlight>
+                  <a:srgbClr val="FFFFFF"/>
+                </a:highlight>
+              </a:rPr>
+              <a:t>,</a:t>
+            </a:r>
+            <a:r>
+              <a:rPr lang="en-US" dirty="0">
+                <a:solidFill>
+                  <a:srgbClr val="000000"/>
+                </a:solidFill>
+                <a:highlight>
+                  <a:srgbClr val="FFFFFF"/>
+                </a:highlight>
+              </a:rPr>
+              <a:t> color</a:t>
+            </a:r>
+            <a:r>
+              <a:rPr lang="en-US" b="1" dirty="0">
+                <a:solidFill>
+                  <a:srgbClr val="000080"/>
+                </a:solidFill>
+                <a:highlight>
+                  <a:srgbClr val="FFFFFF"/>
+                </a:highlight>
+              </a:rPr>
+              <a:t>=</a:t>
+            </a:r>
+            <a:r>
+              <a:rPr lang="en-US" dirty="0">
+                <a:solidFill>
+                  <a:srgbClr val="808080"/>
+                </a:solidFill>
+                <a:highlight>
+                  <a:srgbClr val="FFFFFF"/>
+                </a:highlight>
+              </a:rPr>
+              <a:t>'red'</a:t>
+            </a:r>
+            <a:r>
+              <a:rPr lang="en-US" b="1" dirty="0">
+                <a:solidFill>
+                  <a:srgbClr val="000080"/>
+                </a:solidFill>
+                <a:highlight>
+                  <a:srgbClr val="FFFFFF"/>
+                </a:highlight>
+              </a:rPr>
+              <a:t>)</a:t>
+            </a:r>
+            <a:endParaRPr lang="en-US" dirty="0">
+              <a:solidFill>
+                <a:srgbClr val="000000"/>
+              </a:solidFill>
+              <a:highlight>
+                <a:srgbClr val="FFFFFF"/>
+              </a:highlight>
+            </a:endParaRPr>
+          </a:p>
+          <a:p>
+            <a:r>
+              <a:rPr lang="en-US" dirty="0" err="1">
+                <a:solidFill>
+                  <a:srgbClr val="000000"/>
+                </a:solidFill>
+                <a:highlight>
+                  <a:srgbClr val="FFFFFF"/>
+                </a:highlight>
+              </a:rPr>
+              <a:t>plt</a:t>
+            </a:r>
+            <a:r>
+              <a:rPr lang="en-US" b="1" dirty="0" err="1">
+                <a:solidFill>
+                  <a:srgbClr val="000080"/>
+                </a:solidFill>
+                <a:highlight>
+                  <a:srgbClr val="FFFFFF"/>
+                </a:highlight>
+              </a:rPr>
+              <a:t>.</a:t>
+            </a:r>
+            <a:r>
+              <a:rPr lang="en-US" dirty="0" err="1">
+                <a:solidFill>
+                  <a:srgbClr val="000000"/>
+                </a:solidFill>
+                <a:highlight>
+                  <a:srgbClr val="FFFFFF"/>
+                </a:highlight>
+              </a:rPr>
+              <a:t>plot</a:t>
+            </a:r>
+            <a:r>
+              <a:rPr lang="en-US" b="1" dirty="0">
+                <a:solidFill>
+                  <a:srgbClr val="000080"/>
+                </a:solidFill>
+                <a:highlight>
+                  <a:srgbClr val="FFFFFF"/>
+                </a:highlight>
+              </a:rPr>
+              <a:t>(</a:t>
+            </a:r>
+            <a:r>
+              <a:rPr lang="en-US" dirty="0" err="1">
+                <a:solidFill>
+                  <a:srgbClr val="000000"/>
+                </a:solidFill>
+                <a:highlight>
+                  <a:srgbClr val="FFFFFF"/>
+                </a:highlight>
+              </a:rPr>
+              <a:t>X_train</a:t>
+            </a:r>
+            <a:r>
+              <a:rPr lang="en-US" b="1" dirty="0">
+                <a:solidFill>
+                  <a:srgbClr val="000080"/>
+                </a:solidFill>
+                <a:highlight>
+                  <a:srgbClr val="FFFFFF"/>
+                </a:highlight>
+              </a:rPr>
+              <a:t>,</a:t>
+            </a:r>
+            <a:r>
+              <a:rPr lang="en-US" dirty="0">
+                <a:solidFill>
+                  <a:srgbClr val="000000"/>
+                </a:solidFill>
+                <a:highlight>
+                  <a:srgbClr val="FFFFFF"/>
+                </a:highlight>
+              </a:rPr>
+              <a:t> </a:t>
+            </a:r>
+            <a:r>
+              <a:rPr lang="en-US" dirty="0" err="1">
+                <a:solidFill>
+                  <a:srgbClr val="000000"/>
+                </a:solidFill>
+                <a:highlight>
+                  <a:srgbClr val="FFFFFF"/>
+                </a:highlight>
+              </a:rPr>
+              <a:t>regressor</a:t>
+            </a:r>
+            <a:r>
+              <a:rPr lang="en-US" b="1" dirty="0" err="1">
+                <a:solidFill>
+                  <a:srgbClr val="000080"/>
+                </a:solidFill>
+                <a:highlight>
+                  <a:srgbClr val="FFFFFF"/>
+                </a:highlight>
+              </a:rPr>
+              <a:t>.</a:t>
+            </a:r>
+            <a:r>
+              <a:rPr lang="en-US" dirty="0" err="1">
+                <a:solidFill>
+                  <a:srgbClr val="000000"/>
+                </a:solidFill>
+                <a:highlight>
+                  <a:srgbClr val="FFFFFF"/>
+                </a:highlight>
+              </a:rPr>
+              <a:t>predict</a:t>
+            </a:r>
+            <a:r>
+              <a:rPr lang="en-US" b="1" dirty="0">
+                <a:solidFill>
+                  <a:srgbClr val="000080"/>
+                </a:solidFill>
+                <a:highlight>
+                  <a:srgbClr val="FFFFFF"/>
+                </a:highlight>
+              </a:rPr>
+              <a:t>(</a:t>
+            </a:r>
+            <a:r>
+              <a:rPr lang="en-US" dirty="0" err="1">
+                <a:solidFill>
+                  <a:srgbClr val="000000"/>
+                </a:solidFill>
+                <a:highlight>
+                  <a:srgbClr val="FFFFFF"/>
+                </a:highlight>
+              </a:rPr>
+              <a:t>X_train</a:t>
+            </a:r>
+            <a:r>
+              <a:rPr lang="en-US" b="1" dirty="0">
+                <a:solidFill>
+                  <a:srgbClr val="000080"/>
+                </a:solidFill>
+                <a:highlight>
+                  <a:srgbClr val="FFFFFF"/>
+                </a:highlight>
+              </a:rPr>
+              <a:t>),</a:t>
+            </a:r>
+            <a:r>
+              <a:rPr lang="en-US" dirty="0">
+                <a:solidFill>
+                  <a:srgbClr val="000000"/>
+                </a:solidFill>
+                <a:highlight>
+                  <a:srgbClr val="FFFFFF"/>
+                </a:highlight>
+              </a:rPr>
+              <a:t> color </a:t>
+            </a:r>
+            <a:r>
+              <a:rPr lang="en-US" b="1" dirty="0">
+                <a:solidFill>
+                  <a:srgbClr val="000080"/>
+                </a:solidFill>
+                <a:highlight>
+                  <a:srgbClr val="FFFFFF"/>
+                </a:highlight>
+              </a:rPr>
+              <a:t>=</a:t>
+            </a:r>
+            <a:r>
+              <a:rPr lang="en-US" dirty="0">
+                <a:solidFill>
+                  <a:srgbClr val="000000"/>
+                </a:solidFill>
+                <a:highlight>
+                  <a:srgbClr val="FFFFFF"/>
+                </a:highlight>
+              </a:rPr>
+              <a:t> </a:t>
+            </a:r>
+            <a:r>
+              <a:rPr lang="en-US" dirty="0">
+                <a:solidFill>
+                  <a:srgbClr val="808080"/>
+                </a:solidFill>
+                <a:highlight>
+                  <a:srgbClr val="FFFFFF"/>
+                </a:highlight>
+              </a:rPr>
+              <a:t>'blue'</a:t>
+            </a:r>
+            <a:r>
+              <a:rPr lang="en-US" b="1" dirty="0">
+                <a:solidFill>
+                  <a:srgbClr val="000080"/>
+                </a:solidFill>
+                <a:highlight>
+                  <a:srgbClr val="FFFFFF"/>
+                </a:highlight>
+              </a:rPr>
+              <a:t>)</a:t>
+            </a:r>
+            <a:endParaRPr lang="en-US" dirty="0">
+              <a:solidFill>
+                <a:srgbClr val="000000"/>
+              </a:solidFill>
+              <a:highlight>
+                <a:srgbClr val="FFFFFF"/>
+              </a:highlight>
+            </a:endParaRPr>
+          </a:p>
+          <a:p>
+            <a:r>
+              <a:rPr lang="en-US" dirty="0" err="1">
+                <a:solidFill>
+                  <a:srgbClr val="000000"/>
+                </a:solidFill>
+                <a:highlight>
+                  <a:srgbClr val="FFFFFF"/>
+                </a:highlight>
+              </a:rPr>
+              <a:t>plt</a:t>
+            </a:r>
+            <a:r>
+              <a:rPr lang="en-US" b="1" dirty="0" err="1">
+                <a:solidFill>
+                  <a:srgbClr val="000080"/>
+                </a:solidFill>
+                <a:highlight>
+                  <a:srgbClr val="FFFFFF"/>
+                </a:highlight>
+              </a:rPr>
+              <a:t>.</a:t>
+            </a:r>
+            <a:r>
+              <a:rPr lang="en-US" dirty="0" err="1">
+                <a:solidFill>
+                  <a:srgbClr val="000000"/>
+                </a:solidFill>
+                <a:highlight>
+                  <a:srgbClr val="FFFFFF"/>
+                </a:highlight>
+              </a:rPr>
+              <a:t>title</a:t>
+            </a:r>
+            <a:r>
+              <a:rPr lang="en-US" b="1" dirty="0">
+                <a:solidFill>
+                  <a:srgbClr val="000080"/>
+                </a:solidFill>
+                <a:highlight>
+                  <a:srgbClr val="FFFFFF"/>
+                </a:highlight>
+              </a:rPr>
+              <a:t>(</a:t>
+            </a:r>
+            <a:r>
+              <a:rPr lang="en-US" dirty="0">
+                <a:solidFill>
+                  <a:srgbClr val="808080"/>
+                </a:solidFill>
+                <a:highlight>
+                  <a:srgbClr val="FFFFFF"/>
+                </a:highlight>
+              </a:rPr>
+              <a:t>'Salary vs Experience (Training Set)'</a:t>
+            </a:r>
+            <a:r>
+              <a:rPr lang="en-US" b="1" dirty="0">
+                <a:solidFill>
+                  <a:srgbClr val="000080"/>
+                </a:solidFill>
+                <a:highlight>
+                  <a:srgbClr val="FFFFFF"/>
+                </a:highlight>
+              </a:rPr>
+              <a:t>)</a:t>
+            </a:r>
+            <a:endParaRPr lang="en-US" dirty="0">
+              <a:solidFill>
+                <a:srgbClr val="000000"/>
+              </a:solidFill>
+              <a:highlight>
+                <a:srgbClr val="FFFFFF"/>
+              </a:highlight>
+            </a:endParaRPr>
+          </a:p>
+          <a:p>
+            <a:r>
+              <a:rPr lang="en-US" dirty="0" err="1">
+                <a:solidFill>
+                  <a:srgbClr val="000000"/>
+                </a:solidFill>
+                <a:highlight>
+                  <a:srgbClr val="FFFFFF"/>
+                </a:highlight>
+              </a:rPr>
+              <a:t>plt</a:t>
+            </a:r>
+            <a:r>
+              <a:rPr lang="en-US" b="1" dirty="0" err="1">
+                <a:solidFill>
+                  <a:srgbClr val="000080"/>
+                </a:solidFill>
+                <a:highlight>
+                  <a:srgbClr val="FFFFFF"/>
+                </a:highlight>
+              </a:rPr>
+              <a:t>.</a:t>
+            </a:r>
+            <a:r>
+              <a:rPr lang="en-US" dirty="0" err="1">
+                <a:solidFill>
+                  <a:srgbClr val="000000"/>
+                </a:solidFill>
+                <a:highlight>
+                  <a:srgbClr val="FFFFFF"/>
+                </a:highlight>
+              </a:rPr>
+              <a:t>xlabel</a:t>
+            </a:r>
+            <a:r>
+              <a:rPr lang="en-US" b="1" dirty="0">
+                <a:solidFill>
+                  <a:srgbClr val="000080"/>
+                </a:solidFill>
+                <a:highlight>
+                  <a:srgbClr val="FFFFFF"/>
+                </a:highlight>
+              </a:rPr>
+              <a:t>(</a:t>
+            </a:r>
+            <a:r>
+              <a:rPr lang="en-US" dirty="0">
+                <a:solidFill>
+                  <a:srgbClr val="808080"/>
+                </a:solidFill>
+                <a:highlight>
+                  <a:srgbClr val="FFFFFF"/>
+                </a:highlight>
+              </a:rPr>
+              <a:t>'years of experience'</a:t>
+            </a:r>
+            <a:r>
+              <a:rPr lang="en-US" b="1" dirty="0">
+                <a:solidFill>
+                  <a:srgbClr val="000080"/>
+                </a:solidFill>
+                <a:highlight>
+                  <a:srgbClr val="FFFFFF"/>
+                </a:highlight>
+              </a:rPr>
+              <a:t>)</a:t>
+            </a:r>
+            <a:endParaRPr lang="en-US" dirty="0">
+              <a:solidFill>
+                <a:srgbClr val="000000"/>
+              </a:solidFill>
+              <a:highlight>
+                <a:srgbClr val="FFFFFF"/>
+              </a:highlight>
+            </a:endParaRPr>
+          </a:p>
+          <a:p>
+            <a:r>
+              <a:rPr lang="en-US" dirty="0" err="1">
+                <a:solidFill>
+                  <a:srgbClr val="000000"/>
+                </a:solidFill>
+                <a:highlight>
+                  <a:srgbClr val="FFFFFF"/>
+                </a:highlight>
+              </a:rPr>
+              <a:t>plt</a:t>
+            </a:r>
+            <a:r>
+              <a:rPr lang="en-US" b="1" dirty="0" err="1">
+                <a:solidFill>
+                  <a:srgbClr val="000080"/>
+                </a:solidFill>
+                <a:highlight>
+                  <a:srgbClr val="FFFFFF"/>
+                </a:highlight>
+              </a:rPr>
+              <a:t>.</a:t>
+            </a:r>
+            <a:r>
+              <a:rPr lang="en-US" dirty="0" err="1">
+                <a:solidFill>
+                  <a:srgbClr val="000000"/>
+                </a:solidFill>
+                <a:highlight>
+                  <a:srgbClr val="FFFFFF"/>
+                </a:highlight>
+              </a:rPr>
+              <a:t>ylabel</a:t>
+            </a:r>
+            <a:r>
+              <a:rPr lang="en-US" b="1" dirty="0">
+                <a:solidFill>
+                  <a:srgbClr val="000080"/>
+                </a:solidFill>
+                <a:highlight>
+                  <a:srgbClr val="FFFFFF"/>
+                </a:highlight>
+              </a:rPr>
+              <a:t>(</a:t>
+            </a:r>
+            <a:r>
+              <a:rPr lang="en-US" dirty="0">
+                <a:solidFill>
+                  <a:srgbClr val="808080"/>
+                </a:solidFill>
+                <a:highlight>
+                  <a:srgbClr val="FFFFFF"/>
+                </a:highlight>
+              </a:rPr>
+              <a:t>'Salary'</a:t>
+            </a:r>
+            <a:r>
+              <a:rPr lang="en-US" b="1" dirty="0">
+                <a:solidFill>
+                  <a:srgbClr val="000080"/>
+                </a:solidFill>
+                <a:highlight>
+                  <a:srgbClr val="FFFFFF"/>
+                </a:highlight>
+              </a:rPr>
+              <a:t>)</a:t>
+            </a:r>
+            <a:endParaRPr lang="en-US" dirty="0">
+              <a:solidFill>
+                <a:srgbClr val="000000"/>
+              </a:solidFill>
+              <a:highlight>
+                <a:srgbClr val="FFFFFF"/>
+              </a:highlight>
+            </a:endParaRPr>
+          </a:p>
+          <a:p>
+            <a:r>
+              <a:rPr lang="en-US" dirty="0" err="1">
+                <a:solidFill>
+                  <a:srgbClr val="000000"/>
+                </a:solidFill>
+                <a:highlight>
+                  <a:srgbClr val="FFFFFF"/>
+                </a:highlight>
+              </a:rPr>
+              <a:t>plt</a:t>
+            </a:r>
+            <a:r>
+              <a:rPr lang="en-US" b="1" dirty="0" err="1">
+                <a:solidFill>
+                  <a:srgbClr val="000080"/>
+                </a:solidFill>
+                <a:highlight>
+                  <a:srgbClr val="FFFFFF"/>
+                </a:highlight>
+              </a:rPr>
+              <a:t>.</a:t>
+            </a:r>
+            <a:r>
+              <a:rPr lang="en-US" dirty="0" err="1">
+                <a:solidFill>
+                  <a:srgbClr val="000000"/>
+                </a:solidFill>
+                <a:highlight>
+                  <a:srgbClr val="FFFFFF"/>
+                </a:highlight>
+              </a:rPr>
+              <a:t>show</a:t>
+            </a:r>
+            <a:r>
+              <a:rPr lang="en-US" b="1" dirty="0">
+                <a:solidFill>
+                  <a:srgbClr val="000080"/>
+                </a:solidFill>
+                <a:highlight>
+                  <a:srgbClr val="FFFFFF"/>
+                </a:highlight>
+              </a:rPr>
+              <a:t>()</a:t>
+            </a:r>
+            <a:endParaRPr lang="en-US" dirty="0"/>
+          </a:p>
+        </p:txBody>
+      </p:sp>
+      <p:pic>
+        <p:nvPicPr>
+          <p:cNvPr id="7" name="Picture 6" descr="Screen Clipping"/>
+          <p:cNvPicPr>
+            <a:picLocks noChangeAspect="1"/>
+          </p:cNvPicPr>
+          <p:nvPr/>
+        </p:nvPicPr>
+        <p:blipFill>
+          <a:blip r:embed="rId2">
+            <a:extLst>
+              <a:ext uri="{28A0092B-C50C-407E-A947-70E740481C1C}">
+                <a14:useLocalDpi xmlns:a14="http://schemas.microsoft.com/office/drawing/2010/main" val="0"/>
+              </a:ext>
+            </a:extLst>
+          </a:blip>
+          <a:stretch>
+            <a:fillRect/>
+          </a:stretch>
+        </p:blipFill>
+        <p:spPr>
+          <a:xfrm>
+            <a:off x="3538330" y="2819400"/>
+            <a:ext cx="4691270" cy="3082835"/>
+          </a:xfrm>
+          <a:prstGeom prst="rect">
+            <a:avLst/>
+          </a:prstGeom>
+          <a:ln w="38100" cap="sq">
+            <a:solidFill>
+              <a:srgbClr val="000000"/>
+            </a:solidFill>
+            <a:prstDash val="solid"/>
+            <a:miter lim="800000"/>
+          </a:ln>
+          <a:effectLst>
+            <a:outerShdw blurRad="50800" dist="38100" dir="2700000" algn="tl" rotWithShape="0">
+              <a:srgbClr val="000000">
+                <a:alpha val="43000"/>
+              </a:srgbClr>
+            </a:outerShdw>
+          </a:effectLst>
+        </p:spPr>
+      </p:pic>
+    </p:spTree>
+    <p:extLst>
+      <p:ext uri="{BB962C8B-B14F-4D97-AF65-F5344CB8AC3E}">
+        <p14:creationId xmlns:p14="http://schemas.microsoft.com/office/powerpoint/2010/main" val="3970925258"/>
+      </p:ext>
+    </p:extLst>
+  </p:cSld>
+  <p:clrMapOvr>
+    <a:masterClrMapping/>
+  </p:clrMapOvr>
+  <p:timing>
+    <p:tnLst>
+      <p:par>
+        <p:cTn id="1" dur="indefinite" restart="never" nodeType="tmRoot"/>
+      </p:par>
+    </p:tnLst>
+  </p:timing>
+</p:sld>
+</file>
+
+<file path=ppt/slides/slide11.xml><?xml version="1.0" encoding="utf-8"?>
+<p:sld xmlns:a="http://schemas.openxmlformats.org/drawingml/2006/main" xmlns:r="http://schemas.openxmlformats.org/officeDocument/2006/relationships" xmlns:p="http://schemas.openxmlformats.org/presentationml/2006/main">
+  <p:cSld>
+    <p:spTree>
+      <p:nvGrpSpPr>
+        <p:cNvPr id="1" name=""/>
+        <p:cNvGrpSpPr/>
+        <p:nvPr/>
+      </p:nvGrpSpPr>
+      <p:grpSpPr>
+        <a:xfrm>
+          <a:off x="0" y="0"/>
+          <a:ext cx="0" cy="0"/>
+          <a:chOff x="0" y="0"/>
+          <a:chExt cx="0" cy="0"/>
+        </a:xfrm>
+      </p:grpSpPr>
+      <p:sp>
+        <p:nvSpPr>
+          <p:cNvPr id="2" name="Title 1"/>
+          <p:cNvSpPr>
+            <a:spLocks noGrp="1"/>
+          </p:cNvSpPr>
+          <p:nvPr>
+            <p:ph type="title"/>
+          </p:nvPr>
+        </p:nvSpPr>
+        <p:spPr/>
+        <p:txBody>
+          <a:bodyPr/>
+          <a:lstStyle/>
+          <a:p>
+            <a:r>
+              <a:rPr lang="en-US" dirty="0">
+                <a:solidFill>
+                  <a:schemeClr val="accent1">
+                    <a:lumMod val="75000"/>
+                  </a:schemeClr>
+                </a:solidFill>
+              </a:rPr>
+              <a:t>Linear Regression</a:t>
+            </a:r>
+            <a:endParaRPr lang="en-US" dirty="0"/>
+          </a:p>
+        </p:txBody>
+      </p:sp>
+      <p:sp>
+        <p:nvSpPr>
+          <p:cNvPr id="4" name="Date Placeholder 3"/>
+          <p:cNvSpPr>
+            <a:spLocks noGrp="1"/>
+          </p:cNvSpPr>
+          <p:nvPr>
+            <p:ph type="dt" sz="half" idx="10"/>
+          </p:nvPr>
+        </p:nvSpPr>
+        <p:spPr/>
+        <p:txBody>
+          <a:bodyPr/>
+          <a:lstStyle/>
+          <a:p>
+            <a:fld id="{DBB841AE-9C10-4D54-9B76-4773DF3EF110}" type="datetime3">
+              <a:rPr lang="en-US" smtClean="0"/>
+              <a:t>3 January 2019</a:t>
+            </a:fld>
+            <a:endParaRPr lang="en-US"/>
+          </a:p>
+        </p:txBody>
+      </p:sp>
+      <p:sp>
+        <p:nvSpPr>
+          <p:cNvPr id="5" name="Footer Placeholder 4"/>
+          <p:cNvSpPr>
+            <a:spLocks noGrp="1"/>
+          </p:cNvSpPr>
+          <p:nvPr>
+            <p:ph type="ftr" sz="quarter" idx="11"/>
+          </p:nvPr>
+        </p:nvSpPr>
+        <p:spPr/>
+        <p:txBody>
+          <a:bodyPr/>
+          <a:lstStyle/>
+          <a:p>
+            <a:r>
+              <a:rPr lang="en-US" smtClean="0"/>
+              <a:t>sai Prasad Ashila</a:t>
+            </a:r>
+            <a:endParaRPr lang="en-US"/>
+          </a:p>
+        </p:txBody>
+      </p:sp>
+      <p:sp>
+        <p:nvSpPr>
+          <p:cNvPr id="6" name="Slide Number Placeholder 5"/>
+          <p:cNvSpPr>
+            <a:spLocks noGrp="1"/>
+          </p:cNvSpPr>
+          <p:nvPr>
+            <p:ph type="sldNum" sz="quarter" idx="12"/>
+          </p:nvPr>
+        </p:nvSpPr>
+        <p:spPr/>
+        <p:txBody>
+          <a:bodyPr/>
+          <a:lstStyle/>
+          <a:p>
+            <a:fld id="{2EE3F54D-A22C-49A4-910F-D37A9559DC15}" type="slidenum">
+              <a:rPr lang="en-US" smtClean="0"/>
+              <a:t>11</a:t>
+            </a:fld>
+            <a:endParaRPr lang="en-US"/>
+          </a:p>
+        </p:txBody>
+      </p:sp>
+    </p:spTree>
+    <p:extLst>
+      <p:ext uri="{BB962C8B-B14F-4D97-AF65-F5344CB8AC3E}">
+        <p14:creationId xmlns:p14="http://schemas.microsoft.com/office/powerpoint/2010/main" val="2240317078"/>
+      </p:ext>
+    </p:extLst>
+  </p:cSld>
+  <p:clrMapOvr>
+    <a:masterClrMapping/>
+  </p:clrMapOvr>
+  <p:timing>
+    <p:tnLst>
+      <p:par>
+        <p:cTn id="1" dur="indefinite" restart="never" nodeType="tmRoot"/>
+      </p:par>
+    </p:tnLst>
   </p:timing>
 </p:sld>
 </file>
@@ -9268,23 +10284,7 @@
             </a:r>
             <a:r>
               <a:rPr lang="en-US" sz="2000" b="1" dirty="0" smtClean="0"/>
-              <a:t>Salary </a:t>
-            </a:r>
-            <a:r>
-              <a:rPr lang="en-US" sz="2000" b="1" dirty="0" smtClean="0"/>
-              <a:t> </a:t>
-            </a:r>
-            <a:r>
-              <a:rPr lang="en-US" sz="2000" b="1" dirty="0" smtClean="0"/>
-              <a:t>= </a:t>
-            </a:r>
-            <a:r>
-              <a:rPr lang="en-US" sz="2000" b="1" dirty="0" smtClean="0"/>
-              <a:t>m(years of experience) </a:t>
-            </a:r>
-            <a:r>
-              <a:rPr lang="en-US" sz="2000" b="1" dirty="0" smtClean="0"/>
-              <a:t>+ C</a:t>
+              <a:t>Salary  = m(years of experience) + C</a:t>
             </a:r>
             <a:endParaRPr lang="en-US" b="1" dirty="0" smtClean="0"/>
           </a:p>
@@ -9310,7 +10310,6 @@
               <a:rPr lang="en-US" dirty="0" smtClean="0"/>
               <a:t>C the intercept indicates the salary of an entry level employee.</a:t>
             </a:r>
-            <a:endParaRPr lang="en-US" dirty="0" smtClean="0"/>
           </a:p>
         </p:txBody>
       </p:sp>
@@ -13527,6 +14526,36 @@
           </a:p>
         </p:txBody>
       </p:sp>
+      <p:pic>
+        <p:nvPicPr>
+          <p:cNvPr id="7" name="Picture 6" descr="Screen Clipping"/>
+          <p:cNvPicPr>
+            <a:picLocks noChangeAspect="1"/>
+          </p:cNvPicPr>
+          <p:nvPr/>
+        </p:nvPicPr>
+        <p:blipFill>
+          <a:blip r:embed="rId2">
+            <a:extLst>
+              <a:ext uri="{28A0092B-C50C-407E-A947-70E740481C1C}">
+                <a14:useLocalDpi xmlns:a14="http://schemas.microsoft.com/office/drawing/2010/main" val="0"/>
+              </a:ext>
+            </a:extLst>
+          </a:blip>
+          <a:stretch>
+            <a:fillRect/>
+          </a:stretch>
+        </p:blipFill>
+        <p:spPr>
+          <a:xfrm>
+            <a:off x="762000" y="2000056"/>
+            <a:ext cx="6568053" cy="4221769"/>
+          </a:xfrm>
+          <a:prstGeom prst="rect">
+            <a:avLst/>
+          </a:prstGeom>
+        </p:spPr>
+      </p:pic>
     </p:spTree>
     <p:extLst>
       <p:ext uri="{BB962C8B-B14F-4D97-AF65-F5344CB8AC3E}">
@@ -13662,6 +14691,751 @@
           </a:p>
         </p:txBody>
       </p:sp>
+      <p:sp>
+        <p:nvSpPr>
+          <p:cNvPr id="3" name="Rectangle 2"/>
+          <p:cNvSpPr/>
+          <p:nvPr/>
+        </p:nvSpPr>
+        <p:spPr>
+          <a:xfrm>
+            <a:off x="152400" y="1066800"/>
+            <a:ext cx="4572000" cy="2308324"/>
+          </a:xfrm>
+          <a:prstGeom prst="rect">
+            <a:avLst/>
+          </a:prstGeom>
+        </p:spPr>
+        <p:txBody>
+          <a:bodyPr>
+            <a:spAutoFit/>
+          </a:bodyPr>
+          <a:lstStyle/>
+          <a:p>
+            <a:r>
+              <a:rPr lang="en-US" dirty="0">
+                <a:solidFill>
+                  <a:srgbClr val="008000"/>
+                </a:solidFill>
+                <a:highlight>
+                  <a:srgbClr val="FFFFFF"/>
+                </a:highlight>
+              </a:rPr>
+              <a:t>#</a:t>
+            </a:r>
+            <a:r>
+              <a:rPr lang="en-US" dirty="0" err="1">
+                <a:solidFill>
+                  <a:srgbClr val="008000"/>
+                </a:solidFill>
+                <a:highlight>
+                  <a:srgbClr val="FFFFFF"/>
+                </a:highlight>
+              </a:rPr>
+              <a:t>visualising</a:t>
+            </a:r>
+            <a:r>
+              <a:rPr lang="en-US" dirty="0">
+                <a:solidFill>
+                  <a:srgbClr val="008000"/>
+                </a:solidFill>
+                <a:highlight>
+                  <a:srgbClr val="FFFFFF"/>
+                </a:highlight>
+              </a:rPr>
+              <a:t> the Training set results</a:t>
+            </a:r>
+            <a:endParaRPr lang="en-US" dirty="0">
+              <a:solidFill>
+                <a:srgbClr val="000000"/>
+              </a:solidFill>
+              <a:highlight>
+                <a:srgbClr val="FFFFFF"/>
+              </a:highlight>
+            </a:endParaRPr>
+          </a:p>
+          <a:p>
+            <a:r>
+              <a:rPr lang="en-US" dirty="0" err="1">
+                <a:solidFill>
+                  <a:srgbClr val="000000"/>
+                </a:solidFill>
+                <a:highlight>
+                  <a:srgbClr val="FFFFFF"/>
+                </a:highlight>
+              </a:rPr>
+              <a:t>plt</a:t>
+            </a:r>
+            <a:r>
+              <a:rPr lang="en-US" b="1" dirty="0" err="1">
+                <a:solidFill>
+                  <a:srgbClr val="000080"/>
+                </a:solidFill>
+                <a:highlight>
+                  <a:srgbClr val="FFFFFF"/>
+                </a:highlight>
+              </a:rPr>
+              <a:t>.</a:t>
+            </a:r>
+            <a:r>
+              <a:rPr lang="en-US" dirty="0" err="1">
+                <a:solidFill>
+                  <a:srgbClr val="000000"/>
+                </a:solidFill>
+                <a:highlight>
+                  <a:srgbClr val="FFFFFF"/>
+                </a:highlight>
+              </a:rPr>
+              <a:t>scatter</a:t>
+            </a:r>
+            <a:r>
+              <a:rPr lang="en-US" b="1" dirty="0">
+                <a:solidFill>
+                  <a:srgbClr val="000080"/>
+                </a:solidFill>
+                <a:highlight>
+                  <a:srgbClr val="FFFFFF"/>
+                </a:highlight>
+              </a:rPr>
+              <a:t>(</a:t>
+            </a:r>
+            <a:r>
+              <a:rPr lang="en-US" dirty="0" err="1">
+                <a:solidFill>
+                  <a:srgbClr val="000000"/>
+                </a:solidFill>
+                <a:highlight>
+                  <a:srgbClr val="FFFFFF"/>
+                </a:highlight>
+              </a:rPr>
+              <a:t>X_train</a:t>
+            </a:r>
+            <a:r>
+              <a:rPr lang="en-US" b="1" dirty="0">
+                <a:solidFill>
+                  <a:srgbClr val="000080"/>
+                </a:solidFill>
+                <a:highlight>
+                  <a:srgbClr val="FFFFFF"/>
+                </a:highlight>
+              </a:rPr>
+              <a:t>,</a:t>
+            </a:r>
+            <a:r>
+              <a:rPr lang="en-US" dirty="0">
+                <a:solidFill>
+                  <a:srgbClr val="000000"/>
+                </a:solidFill>
+                <a:highlight>
+                  <a:srgbClr val="FFFFFF"/>
+                </a:highlight>
+              </a:rPr>
+              <a:t> </a:t>
+            </a:r>
+            <a:r>
+              <a:rPr lang="en-US" dirty="0" err="1">
+                <a:solidFill>
+                  <a:srgbClr val="000000"/>
+                </a:solidFill>
+                <a:highlight>
+                  <a:srgbClr val="FFFFFF"/>
+                </a:highlight>
+              </a:rPr>
+              <a:t>Y_train</a:t>
+            </a:r>
+            <a:r>
+              <a:rPr lang="en-US" b="1" dirty="0">
+                <a:solidFill>
+                  <a:srgbClr val="000080"/>
+                </a:solidFill>
+                <a:highlight>
+                  <a:srgbClr val="FFFFFF"/>
+                </a:highlight>
+              </a:rPr>
+              <a:t>,</a:t>
+            </a:r>
+            <a:r>
+              <a:rPr lang="en-US" dirty="0">
+                <a:solidFill>
+                  <a:srgbClr val="000000"/>
+                </a:solidFill>
+                <a:highlight>
+                  <a:srgbClr val="FFFFFF"/>
+                </a:highlight>
+              </a:rPr>
+              <a:t> color</a:t>
+            </a:r>
+            <a:r>
+              <a:rPr lang="en-US" b="1" dirty="0">
+                <a:solidFill>
+                  <a:srgbClr val="000080"/>
+                </a:solidFill>
+                <a:highlight>
+                  <a:srgbClr val="FFFFFF"/>
+                </a:highlight>
+              </a:rPr>
+              <a:t>=</a:t>
+            </a:r>
+            <a:r>
+              <a:rPr lang="en-US" dirty="0">
+                <a:solidFill>
+                  <a:srgbClr val="808080"/>
+                </a:solidFill>
+                <a:highlight>
+                  <a:srgbClr val="FFFFFF"/>
+                </a:highlight>
+              </a:rPr>
+              <a:t>'red'</a:t>
+            </a:r>
+            <a:r>
+              <a:rPr lang="en-US" b="1" dirty="0">
+                <a:solidFill>
+                  <a:srgbClr val="000080"/>
+                </a:solidFill>
+                <a:highlight>
+                  <a:srgbClr val="FFFFFF"/>
+                </a:highlight>
+              </a:rPr>
+              <a:t>)</a:t>
+            </a:r>
+            <a:endParaRPr lang="en-US" dirty="0">
+              <a:solidFill>
+                <a:srgbClr val="000000"/>
+              </a:solidFill>
+              <a:highlight>
+                <a:srgbClr val="FFFFFF"/>
+              </a:highlight>
+            </a:endParaRPr>
+          </a:p>
+          <a:p>
+            <a:r>
+              <a:rPr lang="en-US" dirty="0" err="1">
+                <a:solidFill>
+                  <a:srgbClr val="000000"/>
+                </a:solidFill>
+                <a:highlight>
+                  <a:srgbClr val="FFFFFF"/>
+                </a:highlight>
+              </a:rPr>
+              <a:t>plt</a:t>
+            </a:r>
+            <a:r>
+              <a:rPr lang="en-US" b="1" dirty="0" err="1">
+                <a:solidFill>
+                  <a:srgbClr val="000080"/>
+                </a:solidFill>
+                <a:highlight>
+                  <a:srgbClr val="FFFFFF"/>
+                </a:highlight>
+              </a:rPr>
+              <a:t>.</a:t>
+            </a:r>
+            <a:r>
+              <a:rPr lang="en-US" dirty="0" err="1">
+                <a:solidFill>
+                  <a:srgbClr val="000000"/>
+                </a:solidFill>
+                <a:highlight>
+                  <a:srgbClr val="FFFFFF"/>
+                </a:highlight>
+              </a:rPr>
+              <a:t>plot</a:t>
+            </a:r>
+            <a:r>
+              <a:rPr lang="en-US" b="1" dirty="0">
+                <a:solidFill>
+                  <a:srgbClr val="000080"/>
+                </a:solidFill>
+                <a:highlight>
+                  <a:srgbClr val="FFFFFF"/>
+                </a:highlight>
+              </a:rPr>
+              <a:t>(</a:t>
+            </a:r>
+            <a:r>
+              <a:rPr lang="en-US" dirty="0" err="1">
+                <a:solidFill>
+                  <a:srgbClr val="000000"/>
+                </a:solidFill>
+                <a:highlight>
+                  <a:srgbClr val="FFFFFF"/>
+                </a:highlight>
+              </a:rPr>
+              <a:t>X_train</a:t>
+            </a:r>
+            <a:r>
+              <a:rPr lang="en-US" b="1" dirty="0">
+                <a:solidFill>
+                  <a:srgbClr val="000080"/>
+                </a:solidFill>
+                <a:highlight>
+                  <a:srgbClr val="FFFFFF"/>
+                </a:highlight>
+              </a:rPr>
+              <a:t>,</a:t>
+            </a:r>
+            <a:r>
+              <a:rPr lang="en-US" dirty="0">
+                <a:solidFill>
+                  <a:srgbClr val="000000"/>
+                </a:solidFill>
+                <a:highlight>
+                  <a:srgbClr val="FFFFFF"/>
+                </a:highlight>
+              </a:rPr>
+              <a:t> </a:t>
+            </a:r>
+            <a:r>
+              <a:rPr lang="en-US" dirty="0" err="1">
+                <a:solidFill>
+                  <a:srgbClr val="000000"/>
+                </a:solidFill>
+                <a:highlight>
+                  <a:srgbClr val="FFFFFF"/>
+                </a:highlight>
+              </a:rPr>
+              <a:t>regressor</a:t>
+            </a:r>
+            <a:r>
+              <a:rPr lang="en-US" b="1" dirty="0" err="1">
+                <a:solidFill>
+                  <a:srgbClr val="000080"/>
+                </a:solidFill>
+                <a:highlight>
+                  <a:srgbClr val="FFFFFF"/>
+                </a:highlight>
+              </a:rPr>
+              <a:t>.</a:t>
+            </a:r>
+            <a:r>
+              <a:rPr lang="en-US" dirty="0" err="1">
+                <a:solidFill>
+                  <a:srgbClr val="000000"/>
+                </a:solidFill>
+                <a:highlight>
+                  <a:srgbClr val="FFFFFF"/>
+                </a:highlight>
+              </a:rPr>
+              <a:t>predict</a:t>
+            </a:r>
+            <a:r>
+              <a:rPr lang="en-US" b="1" dirty="0">
+                <a:solidFill>
+                  <a:srgbClr val="000080"/>
+                </a:solidFill>
+                <a:highlight>
+                  <a:srgbClr val="FFFFFF"/>
+                </a:highlight>
+              </a:rPr>
+              <a:t>(</a:t>
+            </a:r>
+            <a:r>
+              <a:rPr lang="en-US" dirty="0" err="1">
+                <a:solidFill>
+                  <a:srgbClr val="000000"/>
+                </a:solidFill>
+                <a:highlight>
+                  <a:srgbClr val="FFFFFF"/>
+                </a:highlight>
+              </a:rPr>
+              <a:t>X_train</a:t>
+            </a:r>
+            <a:r>
+              <a:rPr lang="en-US" b="1" dirty="0">
+                <a:solidFill>
+                  <a:srgbClr val="000080"/>
+                </a:solidFill>
+                <a:highlight>
+                  <a:srgbClr val="FFFFFF"/>
+                </a:highlight>
+              </a:rPr>
+              <a:t>),</a:t>
+            </a:r>
+            <a:r>
+              <a:rPr lang="en-US" dirty="0">
+                <a:solidFill>
+                  <a:srgbClr val="000000"/>
+                </a:solidFill>
+                <a:highlight>
+                  <a:srgbClr val="FFFFFF"/>
+                </a:highlight>
+              </a:rPr>
+              <a:t> color </a:t>
+            </a:r>
+            <a:r>
+              <a:rPr lang="en-US" b="1" dirty="0">
+                <a:solidFill>
+                  <a:srgbClr val="000080"/>
+                </a:solidFill>
+                <a:highlight>
+                  <a:srgbClr val="FFFFFF"/>
+                </a:highlight>
+              </a:rPr>
+              <a:t>=</a:t>
+            </a:r>
+            <a:r>
+              <a:rPr lang="en-US" dirty="0">
+                <a:solidFill>
+                  <a:srgbClr val="000000"/>
+                </a:solidFill>
+                <a:highlight>
+                  <a:srgbClr val="FFFFFF"/>
+                </a:highlight>
+              </a:rPr>
+              <a:t> </a:t>
+            </a:r>
+            <a:r>
+              <a:rPr lang="en-US" dirty="0">
+                <a:solidFill>
+                  <a:srgbClr val="808080"/>
+                </a:solidFill>
+                <a:highlight>
+                  <a:srgbClr val="FFFFFF"/>
+                </a:highlight>
+              </a:rPr>
+              <a:t>'blue'</a:t>
+            </a:r>
+            <a:r>
+              <a:rPr lang="en-US" b="1" dirty="0">
+                <a:solidFill>
+                  <a:srgbClr val="000080"/>
+                </a:solidFill>
+                <a:highlight>
+                  <a:srgbClr val="FFFFFF"/>
+                </a:highlight>
+              </a:rPr>
+              <a:t>)</a:t>
+            </a:r>
+            <a:endParaRPr lang="en-US" dirty="0">
+              <a:solidFill>
+                <a:srgbClr val="000000"/>
+              </a:solidFill>
+              <a:highlight>
+                <a:srgbClr val="FFFFFF"/>
+              </a:highlight>
+            </a:endParaRPr>
+          </a:p>
+          <a:p>
+            <a:r>
+              <a:rPr lang="en-US" dirty="0" err="1">
+                <a:solidFill>
+                  <a:srgbClr val="000000"/>
+                </a:solidFill>
+                <a:highlight>
+                  <a:srgbClr val="FFFFFF"/>
+                </a:highlight>
+              </a:rPr>
+              <a:t>plt</a:t>
+            </a:r>
+            <a:r>
+              <a:rPr lang="en-US" b="1" dirty="0" err="1">
+                <a:solidFill>
+                  <a:srgbClr val="000080"/>
+                </a:solidFill>
+                <a:highlight>
+                  <a:srgbClr val="FFFFFF"/>
+                </a:highlight>
+              </a:rPr>
+              <a:t>.</a:t>
+            </a:r>
+            <a:r>
+              <a:rPr lang="en-US" dirty="0" err="1">
+                <a:solidFill>
+                  <a:srgbClr val="000000"/>
+                </a:solidFill>
+                <a:highlight>
+                  <a:srgbClr val="FFFFFF"/>
+                </a:highlight>
+              </a:rPr>
+              <a:t>title</a:t>
+            </a:r>
+            <a:r>
+              <a:rPr lang="en-US" b="1" dirty="0">
+                <a:solidFill>
+                  <a:srgbClr val="000080"/>
+                </a:solidFill>
+                <a:highlight>
+                  <a:srgbClr val="FFFFFF"/>
+                </a:highlight>
+              </a:rPr>
+              <a:t>(</a:t>
+            </a:r>
+            <a:r>
+              <a:rPr lang="en-US" dirty="0">
+                <a:solidFill>
+                  <a:srgbClr val="808080"/>
+                </a:solidFill>
+                <a:highlight>
+                  <a:srgbClr val="FFFFFF"/>
+                </a:highlight>
+              </a:rPr>
+              <a:t>'Salary vs Experience (Training Set)'</a:t>
+            </a:r>
+            <a:r>
+              <a:rPr lang="en-US" b="1" dirty="0">
+                <a:solidFill>
+                  <a:srgbClr val="000080"/>
+                </a:solidFill>
+                <a:highlight>
+                  <a:srgbClr val="FFFFFF"/>
+                </a:highlight>
+              </a:rPr>
+              <a:t>)</a:t>
+            </a:r>
+            <a:endParaRPr lang="en-US" dirty="0">
+              <a:solidFill>
+                <a:srgbClr val="000000"/>
+              </a:solidFill>
+              <a:highlight>
+                <a:srgbClr val="FFFFFF"/>
+              </a:highlight>
+            </a:endParaRPr>
+          </a:p>
+          <a:p>
+            <a:r>
+              <a:rPr lang="en-US" dirty="0" err="1">
+                <a:solidFill>
+                  <a:srgbClr val="000000"/>
+                </a:solidFill>
+                <a:highlight>
+                  <a:srgbClr val="FFFFFF"/>
+                </a:highlight>
+              </a:rPr>
+              <a:t>plt</a:t>
+            </a:r>
+            <a:r>
+              <a:rPr lang="en-US" b="1" dirty="0" err="1">
+                <a:solidFill>
+                  <a:srgbClr val="000080"/>
+                </a:solidFill>
+                <a:highlight>
+                  <a:srgbClr val="FFFFFF"/>
+                </a:highlight>
+              </a:rPr>
+              <a:t>.</a:t>
+            </a:r>
+            <a:r>
+              <a:rPr lang="en-US" dirty="0" err="1">
+                <a:solidFill>
+                  <a:srgbClr val="000000"/>
+                </a:solidFill>
+                <a:highlight>
+                  <a:srgbClr val="FFFFFF"/>
+                </a:highlight>
+              </a:rPr>
+              <a:t>xlabel</a:t>
+            </a:r>
+            <a:r>
+              <a:rPr lang="en-US" b="1" dirty="0">
+                <a:solidFill>
+                  <a:srgbClr val="000080"/>
+                </a:solidFill>
+                <a:highlight>
+                  <a:srgbClr val="FFFFFF"/>
+                </a:highlight>
+              </a:rPr>
+              <a:t>(</a:t>
+            </a:r>
+            <a:r>
+              <a:rPr lang="en-US" dirty="0">
+                <a:solidFill>
+                  <a:srgbClr val="808080"/>
+                </a:solidFill>
+                <a:highlight>
+                  <a:srgbClr val="FFFFFF"/>
+                </a:highlight>
+              </a:rPr>
+              <a:t>'years of experience'</a:t>
+            </a:r>
+            <a:r>
+              <a:rPr lang="en-US" b="1" dirty="0">
+                <a:solidFill>
+                  <a:srgbClr val="000080"/>
+                </a:solidFill>
+                <a:highlight>
+                  <a:srgbClr val="FFFFFF"/>
+                </a:highlight>
+              </a:rPr>
+              <a:t>)</a:t>
+            </a:r>
+            <a:endParaRPr lang="en-US" dirty="0">
+              <a:solidFill>
+                <a:srgbClr val="000000"/>
+              </a:solidFill>
+              <a:highlight>
+                <a:srgbClr val="FFFFFF"/>
+              </a:highlight>
+            </a:endParaRPr>
+          </a:p>
+          <a:p>
+            <a:r>
+              <a:rPr lang="en-US" dirty="0" err="1">
+                <a:solidFill>
+                  <a:srgbClr val="000000"/>
+                </a:solidFill>
+                <a:highlight>
+                  <a:srgbClr val="FFFFFF"/>
+                </a:highlight>
+              </a:rPr>
+              <a:t>plt</a:t>
+            </a:r>
+            <a:r>
+              <a:rPr lang="en-US" b="1" dirty="0" err="1">
+                <a:solidFill>
+                  <a:srgbClr val="000080"/>
+                </a:solidFill>
+                <a:highlight>
+                  <a:srgbClr val="FFFFFF"/>
+                </a:highlight>
+              </a:rPr>
+              <a:t>.</a:t>
+            </a:r>
+            <a:r>
+              <a:rPr lang="en-US" dirty="0" err="1">
+                <a:solidFill>
+                  <a:srgbClr val="000000"/>
+                </a:solidFill>
+                <a:highlight>
+                  <a:srgbClr val="FFFFFF"/>
+                </a:highlight>
+              </a:rPr>
+              <a:t>ylabel</a:t>
+            </a:r>
+            <a:r>
+              <a:rPr lang="en-US" b="1" dirty="0">
+                <a:solidFill>
+                  <a:srgbClr val="000080"/>
+                </a:solidFill>
+                <a:highlight>
+                  <a:srgbClr val="FFFFFF"/>
+                </a:highlight>
+              </a:rPr>
+              <a:t>(</a:t>
+            </a:r>
+            <a:r>
+              <a:rPr lang="en-US" dirty="0">
+                <a:solidFill>
+                  <a:srgbClr val="808080"/>
+                </a:solidFill>
+                <a:highlight>
+                  <a:srgbClr val="FFFFFF"/>
+                </a:highlight>
+              </a:rPr>
+              <a:t>'Salary'</a:t>
+            </a:r>
+            <a:r>
+              <a:rPr lang="en-US" b="1" dirty="0">
+                <a:solidFill>
+                  <a:srgbClr val="000080"/>
+                </a:solidFill>
+                <a:highlight>
+                  <a:srgbClr val="FFFFFF"/>
+                </a:highlight>
+              </a:rPr>
+              <a:t>)</a:t>
+            </a:r>
+            <a:endParaRPr lang="en-US" dirty="0">
+              <a:solidFill>
+                <a:srgbClr val="000000"/>
+              </a:solidFill>
+              <a:highlight>
+                <a:srgbClr val="FFFFFF"/>
+              </a:highlight>
+            </a:endParaRPr>
+          </a:p>
+          <a:p>
+            <a:r>
+              <a:rPr lang="en-US" dirty="0" err="1">
+                <a:solidFill>
+                  <a:srgbClr val="000000"/>
+                </a:solidFill>
+                <a:highlight>
+                  <a:srgbClr val="FFFFFF"/>
+                </a:highlight>
+              </a:rPr>
+              <a:t>plt</a:t>
+            </a:r>
+            <a:r>
+              <a:rPr lang="en-US" b="1" dirty="0" err="1">
+                <a:solidFill>
+                  <a:srgbClr val="000080"/>
+                </a:solidFill>
+                <a:highlight>
+                  <a:srgbClr val="FFFFFF"/>
+                </a:highlight>
+              </a:rPr>
+              <a:t>.</a:t>
+            </a:r>
+            <a:r>
+              <a:rPr lang="en-US" dirty="0" err="1">
+                <a:solidFill>
+                  <a:srgbClr val="000000"/>
+                </a:solidFill>
+                <a:highlight>
+                  <a:srgbClr val="FFFFFF"/>
+                </a:highlight>
+              </a:rPr>
+              <a:t>show</a:t>
+            </a:r>
+            <a:r>
+              <a:rPr lang="en-US" b="1" dirty="0">
+                <a:solidFill>
+                  <a:srgbClr val="000080"/>
+                </a:solidFill>
+                <a:highlight>
+                  <a:srgbClr val="FFFFFF"/>
+                </a:highlight>
+              </a:rPr>
+              <a:t>()</a:t>
+            </a:r>
+            <a:endParaRPr lang="en-US" dirty="0"/>
+          </a:p>
+        </p:txBody>
+      </p:sp>
+      <p:pic>
+        <p:nvPicPr>
+          <p:cNvPr id="8" name="Picture 7" descr="Screen Clipping"/>
+          <p:cNvPicPr>
+            <a:picLocks noChangeAspect="1"/>
+          </p:cNvPicPr>
+          <p:nvPr/>
+        </p:nvPicPr>
+        <p:blipFill>
+          <a:blip r:embed="rId2">
+            <a:extLst>
+              <a:ext uri="{28A0092B-C50C-407E-A947-70E740481C1C}">
+                <a14:useLocalDpi xmlns:a14="http://schemas.microsoft.com/office/drawing/2010/main" val="0"/>
+              </a:ext>
+            </a:extLst>
+          </a:blip>
+          <a:stretch>
+            <a:fillRect/>
+          </a:stretch>
+        </p:blipFill>
+        <p:spPr>
+          <a:xfrm>
+            <a:off x="3098355" y="2895600"/>
+            <a:ext cx="4530437" cy="2971800"/>
+          </a:xfrm>
+          <a:prstGeom prst="rect">
+            <a:avLst/>
+          </a:prstGeom>
+          <a:ln w="38100" cap="sq">
+            <a:solidFill>
+              <a:srgbClr val="000000"/>
+            </a:solidFill>
+            <a:prstDash val="solid"/>
+            <a:miter lim="800000"/>
+          </a:ln>
+          <a:effectLst>
+            <a:outerShdw blurRad="50800" dist="38100" dir="2700000" algn="tl" rotWithShape="0">
+              <a:srgbClr val="000000">
+                <a:alpha val="43000"/>
+              </a:srgbClr>
+            </a:outerShdw>
+          </a:effectLst>
+        </p:spPr>
+      </p:pic>
     </p:spTree>
     <p:extLst>
       <p:ext uri="{BB962C8B-B14F-4D97-AF65-F5344CB8AC3E}">

</xml_diff>